<commit_message>
Update visualization file with latest updated histogram and scatter plot
</commit_message>
<xml_diff>
--- a/Group A336 RQ Presentation.pptx
+++ b/Group A336 RQ Presentation.pptx
@@ -253,7 +253,7 @@
             <a:fld id="{93FAAC3A-BD1F-4A00-9099-74B95789FE00}" type="datetimeFigureOut">
               <a:rPr lang="en-GB" smtClean="0"/>
               <a:pPr/>
-              <a:t>19/11/2024</a:t>
+              <a:t>23/11/2024</a:t>
             </a:fld>
             <a:endParaRPr lang="en-GB"/>
           </a:p>
@@ -432,7 +432,7 @@
             <a:fld id="{8E359C8A-39F6-4045-9163-4042C4C26B15}" type="datetimeFigureOut">
               <a:rPr lang="en-GB" smtClean="0"/>
               <a:pPr/>
-              <a:t>19/11/2024</a:t>
+              <a:t>23/11/2024</a:t>
             </a:fld>
             <a:endParaRPr lang="en-GB"/>
           </a:p>
@@ -6537,23 +6537,6 @@
 </file>
 
 <file path=customXml/item1.xml><?xml version="1.0" encoding="utf-8"?>
-<?mso-contentType ?>
-<FormTemplates xmlns="http://schemas.microsoft.com/sharepoint/v3/contenttype/forms">
-  <Display>DocumentLibraryForm</Display>
-  <Edit>DocumentLibraryForm</Edit>
-  <New>DocumentLibraryForm</New>
-</FormTemplates>
-</file>
-
-<file path=customXml/item2.xml><?xml version="1.0" encoding="utf-8"?>
-<p:properties xmlns:p="http://schemas.microsoft.com/office/2006/metadata/properties" xmlns:xsi="http://www.w3.org/2001/XMLSchema-instance" xmlns:pc="http://schemas.microsoft.com/office/infopath/2007/PartnerControls">
-  <documentManagement>
-    <Information xmlns="4ad138b4-2b68-4b70-945d-07f8f18b1c9a" xsi:nil="true"/>
-  </documentManagement>
-</p:properties>
-</file>
-
-<file path=customXml/item3.xml><?xml version="1.0" encoding="utf-8"?>
 <ct:contentTypeSchema xmlns:ct="http://schemas.microsoft.com/office/2006/metadata/contentType" xmlns:ma="http://schemas.microsoft.com/office/2006/metadata/properties/metaAttributes" ct:_="" ma:_="" ma:contentTypeName="Document" ma:contentTypeID="0x01010026DBA85F447B164191BB36C258697B67" ma:contentTypeVersion="14" ma:contentTypeDescription="Create a new document." ma:contentTypeScope="" ma:versionID="ea511d05ca7f895fe9556935b5c9af34">
   <xsd:schema xmlns:xsd="http://www.w3.org/2001/XMLSchema" xmlns:xs="http://www.w3.org/2001/XMLSchema" xmlns:p="http://schemas.microsoft.com/office/2006/metadata/properties" xmlns:ns2="4ad138b4-2b68-4b70-945d-07f8f18b1c9a" xmlns:ns3="3c474641-ec36-472f-b125-6b1b0910eaa4" targetNamespace="http://schemas.microsoft.com/office/2006/metadata/properties" ma:root="true" ma:fieldsID="662270106d7a7e100bcac2c5f8d29899" ns2:_="" ns3:_="">
     <xsd:import namespace="4ad138b4-2b68-4b70-945d-07f8f18b1c9a"/>
@@ -6778,10 +6761,38 @@
 </ct:contentTypeSchema>
 </file>
 
+<file path=customXml/item2.xml><?xml version="1.0" encoding="utf-8"?>
+<p:properties xmlns:p="http://schemas.microsoft.com/office/2006/metadata/properties" xmlns:xsi="http://www.w3.org/2001/XMLSchema-instance" xmlns:pc="http://schemas.microsoft.com/office/infopath/2007/PartnerControls">
+  <documentManagement>
+    <Information xmlns="4ad138b4-2b68-4b70-945d-07f8f18b1c9a" xsi:nil="true"/>
+  </documentManagement>
+</p:properties>
+</file>
+
+<file path=customXml/item3.xml><?xml version="1.0" encoding="utf-8"?>
+<?mso-contentType ?>
+<FormTemplates xmlns="http://schemas.microsoft.com/sharepoint/v3/contenttype/forms">
+  <Display>DocumentLibraryForm</Display>
+  <Edit>DocumentLibraryForm</Edit>
+  <New>DocumentLibraryForm</New>
+</FormTemplates>
+</file>
+
 <file path=customXml/itemProps1.xml><?xml version="1.0" encoding="utf-8"?>
-<ds:datastoreItem xmlns:ds="http://schemas.openxmlformats.org/officeDocument/2006/customXml" ds:itemID="{91C521DD-2673-4EE6-BB9B-DC5C3320FFBB}">
+<ds:datastoreItem xmlns:ds="http://schemas.openxmlformats.org/officeDocument/2006/customXml" ds:itemID="{421B8C57-903D-4D0E-8336-7B512F760CD1}">
   <ds:schemaRefs>
-    <ds:schemaRef ds:uri="http://schemas.microsoft.com/sharepoint/v3/contenttype/forms"/>
+    <ds:schemaRef ds:uri="http://schemas.microsoft.com/office/2006/metadata/contentType"/>
+    <ds:schemaRef ds:uri="http://schemas.microsoft.com/office/2006/metadata/properties/metaAttributes"/>
+    <ds:schemaRef ds:uri="http://www.w3.org/2001/XMLSchema"/>
+    <ds:schemaRef ds:uri="http://schemas.microsoft.com/office/2006/metadata/properties"/>
+    <ds:schemaRef ds:uri="4ad138b4-2b68-4b70-945d-07f8f18b1c9a"/>
+    <ds:schemaRef ds:uri="3c474641-ec36-472f-b125-6b1b0910eaa4"/>
+    <ds:schemaRef ds:uri="http://schemas.microsoft.com/office/2006/documentManagement/types"/>
+    <ds:schemaRef ds:uri="http://schemas.microsoft.com/office/infopath/2007/PartnerControls"/>
+    <ds:schemaRef ds:uri="http://schemas.openxmlformats.org/package/2006/metadata/core-properties"/>
+    <ds:schemaRef ds:uri="http://purl.org/dc/elements/1.1/"/>
+    <ds:schemaRef ds:uri="http://purl.org/dc/terms/"/>
+    <ds:schemaRef ds:uri="http://schemas.microsoft.com/internal/obd"/>
   </ds:schemaRefs>
 </ds:datastoreItem>
 </file>
@@ -6804,20 +6815,9 @@
 </file>
 
 <file path=customXml/itemProps3.xml><?xml version="1.0" encoding="utf-8"?>
-<ds:datastoreItem xmlns:ds="http://schemas.openxmlformats.org/officeDocument/2006/customXml" ds:itemID="{421B8C57-903D-4D0E-8336-7B512F760CD1}">
+<ds:datastoreItem xmlns:ds="http://schemas.openxmlformats.org/officeDocument/2006/customXml" ds:itemID="{91C521DD-2673-4EE6-BB9B-DC5C3320FFBB}">
   <ds:schemaRefs>
-    <ds:schemaRef ds:uri="http://schemas.microsoft.com/office/2006/metadata/contentType"/>
-    <ds:schemaRef ds:uri="http://schemas.microsoft.com/office/2006/metadata/properties/metaAttributes"/>
-    <ds:schemaRef ds:uri="http://www.w3.org/2001/XMLSchema"/>
-    <ds:schemaRef ds:uri="http://schemas.microsoft.com/office/2006/metadata/properties"/>
-    <ds:schemaRef ds:uri="4ad138b4-2b68-4b70-945d-07f8f18b1c9a"/>
-    <ds:schemaRef ds:uri="3c474641-ec36-472f-b125-6b1b0910eaa4"/>
-    <ds:schemaRef ds:uri="http://schemas.microsoft.com/office/2006/documentManagement/types"/>
-    <ds:schemaRef ds:uri="http://schemas.microsoft.com/office/infopath/2007/PartnerControls"/>
-    <ds:schemaRef ds:uri="http://schemas.openxmlformats.org/package/2006/metadata/core-properties"/>
-    <ds:schemaRef ds:uri="http://purl.org/dc/elements/1.1/"/>
-    <ds:schemaRef ds:uri="http://purl.org/dc/terms/"/>
-    <ds:schemaRef ds:uri="http://schemas.microsoft.com/internal/obd"/>
+    <ds:schemaRef ds:uri="http://schemas.microsoft.com/sharepoint/v3/contenttype/forms"/>
   </ds:schemaRefs>
 </ds:datastoreItem>
 </file>
</xml_diff>